<commit_message>
fix type in loop in powerpoint
</commit_message>
<xml_diff>
--- a/spring20/assignment04/assignment04 - Part 2.pptx
+++ b/spring20/assignment04/assignment04 - Part 2.pptx
@@ -12234,7 +12234,7 @@
         <p:spPr/>
         <p:txBody>
           <a:bodyPr>
-            <a:normAutofit/>
+            <a:normAutofit lnSpcReduction="10000"/>
           </a:bodyPr>
           <a:lstStyle/>
           <a:p>
@@ -12310,19 +12310,7 @@
               <a:rPr lang="en-US" dirty="0">
                 <a:latin typeface="Consolas" panose="020B0609020204030204" pitchFamily="49" charset="0"/>
               </a:rPr>
-              <a:t> + 1; </a:t>
-            </a:r>
-            <a:r>
-              <a:rPr lang="en-US" dirty="0" err="1">
-                <a:latin typeface="Consolas" panose="020B0609020204030204" pitchFamily="49" charset="0"/>
-              </a:rPr>
-              <a:t>i</a:t>
-            </a:r>
-            <a:r>
-              <a:rPr lang="en-US" dirty="0">
-                <a:latin typeface="Consolas" panose="020B0609020204030204" pitchFamily="49" charset="0"/>
-              </a:rPr>
-              <a:t> &lt; </a:t>
+              <a:t> + 1; j &lt; </a:t>
             </a:r>
             <a:r>
               <a:rPr lang="en-US" dirty="0" err="1">
@@ -12386,6 +12374,26 @@
                 <a:latin typeface="Consolas" panose="020B0609020204030204" pitchFamily="49" charset="0"/>
               </a:rPr>
               <a:t>              // if there is a collision, store the ball indexes in a field that you can access outside of the loop to 	       use in your report</a:t>
+            </a:r>
+          </a:p>
+          <a:p>
+            <a:r>
+              <a:rPr lang="en-US" sz="1000" dirty="0">
+                <a:latin typeface="Consolas" panose="020B0609020204030204" pitchFamily="49" charset="0"/>
+              </a:rPr>
+              <a:t>                ball1Collided = </a:t>
+            </a:r>
+            <a:r>
+              <a:rPr lang="en-US" sz="1000" dirty="0" err="1">
+                <a:latin typeface="Consolas" panose="020B0609020204030204" pitchFamily="49" charset="0"/>
+              </a:rPr>
+              <a:t>i</a:t>
+            </a:r>
+            <a:r>
+              <a:rPr lang="en-US" sz="1000" dirty="0">
+                <a:latin typeface="Consolas" panose="020B0609020204030204" pitchFamily="49" charset="0"/>
+              </a:rPr>
+              <a:t>;</a:t>
             </a:r>
           </a:p>
           <a:p>

</xml_diff>